<commit_message>
Mala promena u prezentaciji
</commit_message>
<xml_diff>
--- a/prezentacija.pptx
+++ b/prezentacija.pptx
@@ -5939,48 +5939,9 @@
             <a:endParaRPr lang="en-US" dirty="0"/>
           </a:p>
           <a:p>
-            <a:endParaRPr lang="en-US" dirty="0"/>
-          </a:p>
-          <a:p>
-            <a:r>
-              <a:rPr lang="en-US" dirty="0" err="1"/>
-              <a:t>Algoritam</a:t>
-            </a:r>
-            <a:r>
-              <a:rPr lang="en-US" dirty="0"/>
-              <a:t> za </a:t>
-            </a:r>
-            <a:r>
-              <a:rPr lang="en-US" dirty="0" err="1"/>
-              <a:t>klasterovanje</a:t>
-            </a:r>
-            <a:r>
-              <a:rPr lang="en-US" dirty="0"/>
-              <a:t> koji </a:t>
-            </a:r>
-            <a:r>
-              <a:rPr lang="en-US" dirty="0" err="1"/>
-              <a:t>smo</a:t>
-            </a:r>
-            <a:r>
-              <a:rPr lang="en-US" dirty="0"/>
-              <a:t> </a:t>
-            </a:r>
-            <a:r>
-              <a:rPr lang="en-US" dirty="0" err="1"/>
-              <a:t>koristili</a:t>
-            </a:r>
-            <a:r>
-              <a:rPr lang="en-US" dirty="0"/>
-              <a:t> je </a:t>
-            </a:r>
-            <a:r>
-              <a:rPr lang="en-US" dirty="0" err="1"/>
-              <a:t>AgglomerativeClustering</a:t>
-            </a:r>
-            <a:endParaRPr lang="en-US" dirty="0"/>
-          </a:p>
-          <a:p>
+            <a:pPr marL="0" indent="0">
+              <a:buNone/>
+            </a:pPr>
             <a:endParaRPr lang="en-US" dirty="0"/>
           </a:p>
           <a:p>

</xml_diff>

<commit_message>
doati slajdovi za mapper
</commit_message>
<xml_diff>
--- a/prezentacija.pptx
+++ b/prezentacija.pptx
@@ -14,10 +14,12 @@
     <p:sldId id="262" r:id="rId8"/>
     <p:sldId id="263" r:id="rId9"/>
     <p:sldId id="264" r:id="rId10"/>
-    <p:sldId id="265" r:id="rId11"/>
-    <p:sldId id="266" r:id="rId12"/>
-    <p:sldId id="268" r:id="rId13"/>
-    <p:sldId id="267" r:id="rId14"/>
+    <p:sldId id="269" r:id="rId11"/>
+    <p:sldId id="270" r:id="rId12"/>
+    <p:sldId id="265" r:id="rId13"/>
+    <p:sldId id="266" r:id="rId14"/>
+    <p:sldId id="268" r:id="rId15"/>
+    <p:sldId id="267" r:id="rId16"/>
   </p:sldIdLst>
   <p:sldSz cx="12192000" cy="6858000"/>
   <p:notesSz cx="6858000" cy="9144000"/>
@@ -337,7 +339,7 @@
           <a:p>
             <a:fld id="{E4E2E80C-70A6-4D76-B6F8-959F074A456C}" type="datetimeFigureOut">
               <a:rPr lang="en-US" smtClean="0"/>
-              <a:t>08-Jun-21</a:t>
+              <a:t>09-Jun-21</a:t>
             </a:fld>
             <a:endParaRPr lang="en-US"/>
           </a:p>
@@ -628,7 +630,7 @@
           <a:p>
             <a:fld id="{E4E2E80C-70A6-4D76-B6F8-959F074A456C}" type="datetimeFigureOut">
               <a:rPr lang="en-US" smtClean="0"/>
-              <a:t>08-Jun-21</a:t>
+              <a:t>09-Jun-21</a:t>
             </a:fld>
             <a:endParaRPr lang="en-US"/>
           </a:p>
@@ -887,7 +889,7 @@
           <a:p>
             <a:fld id="{E4E2E80C-70A6-4D76-B6F8-959F074A456C}" type="datetimeFigureOut">
               <a:rPr lang="en-US" smtClean="0"/>
-              <a:t>08-Jun-21</a:t>
+              <a:t>09-Jun-21</a:t>
             </a:fld>
             <a:endParaRPr lang="en-US"/>
           </a:p>
@@ -1356,7 +1358,7 @@
           <a:p>
             <a:fld id="{E4E2E80C-70A6-4D76-B6F8-959F074A456C}" type="datetimeFigureOut">
               <a:rPr lang="en-US" smtClean="0"/>
-              <a:t>08-Jun-21</a:t>
+              <a:t>09-Jun-21</a:t>
             </a:fld>
             <a:endParaRPr lang="en-US"/>
           </a:p>
@@ -1536,7 +1538,7 @@
           <a:p>
             <a:fld id="{E4E2E80C-70A6-4D76-B6F8-959F074A456C}" type="datetimeFigureOut">
               <a:rPr lang="en-US" smtClean="0"/>
-              <a:t>08-Jun-21</a:t>
+              <a:t>09-Jun-21</a:t>
             </a:fld>
             <a:endParaRPr lang="en-US"/>
           </a:p>
@@ -2112,7 +2114,7 @@
           <a:p>
             <a:fld id="{E4E2E80C-70A6-4D76-B6F8-959F074A456C}" type="datetimeFigureOut">
               <a:rPr lang="en-US" smtClean="0"/>
-              <a:t>08-Jun-21</a:t>
+              <a:t>09-Jun-21</a:t>
             </a:fld>
             <a:endParaRPr lang="en-US"/>
           </a:p>
@@ -2444,7 +2446,7 @@
           <a:p>
             <a:fld id="{E4E2E80C-70A6-4D76-B6F8-959F074A456C}" type="datetimeFigureOut">
               <a:rPr lang="en-US" smtClean="0"/>
-              <a:t>08-Jun-21</a:t>
+              <a:t>09-Jun-21</a:t>
             </a:fld>
             <a:endParaRPr lang="en-US"/>
           </a:p>
@@ -2619,7 +2621,7 @@
           <a:p>
             <a:fld id="{E4E2E80C-70A6-4D76-B6F8-959F074A456C}" type="datetimeFigureOut">
               <a:rPr lang="en-US" smtClean="0"/>
-              <a:t>08-Jun-21</a:t>
+              <a:t>09-Jun-21</a:t>
             </a:fld>
             <a:endParaRPr lang="en-US"/>
           </a:p>
@@ -2799,7 +2801,7 @@
           <a:p>
             <a:fld id="{E4E2E80C-70A6-4D76-B6F8-959F074A456C}" type="datetimeFigureOut">
               <a:rPr lang="en-US" smtClean="0"/>
-              <a:t>08-Jun-21</a:t>
+              <a:t>09-Jun-21</a:t>
             </a:fld>
             <a:endParaRPr lang="en-US"/>
           </a:p>
@@ -2969,7 +2971,7 @@
           <a:p>
             <a:fld id="{E4E2E80C-70A6-4D76-B6F8-959F074A456C}" type="datetimeFigureOut">
               <a:rPr lang="en-US" smtClean="0"/>
-              <a:t>08-Jun-21</a:t>
+              <a:t>09-Jun-21</a:t>
             </a:fld>
             <a:endParaRPr lang="en-US"/>
           </a:p>
@@ -3226,7 +3228,7 @@
           <a:p>
             <a:fld id="{E4E2E80C-70A6-4D76-B6F8-959F074A456C}" type="datetimeFigureOut">
               <a:rPr lang="en-US" smtClean="0"/>
-              <a:t>08-Jun-21</a:t>
+              <a:t>09-Jun-21</a:t>
             </a:fld>
             <a:endParaRPr lang="en-US"/>
           </a:p>
@@ -3518,7 +3520,7 @@
           <a:p>
             <a:fld id="{E4E2E80C-70A6-4D76-B6F8-959F074A456C}" type="datetimeFigureOut">
               <a:rPr lang="en-US" smtClean="0"/>
-              <a:t>08-Jun-21</a:t>
+              <a:t>09-Jun-21</a:t>
             </a:fld>
             <a:endParaRPr lang="en-US"/>
           </a:p>
@@ -3948,7 +3950,7 @@
           <a:p>
             <a:fld id="{E4E2E80C-70A6-4D76-B6F8-959F074A456C}" type="datetimeFigureOut">
               <a:rPr lang="en-US" smtClean="0"/>
-              <a:t>08-Jun-21</a:t>
+              <a:t>09-Jun-21</a:t>
             </a:fld>
             <a:endParaRPr lang="en-US"/>
           </a:p>
@@ -4066,7 +4068,7 @@
           <a:p>
             <a:fld id="{E4E2E80C-70A6-4D76-B6F8-959F074A456C}" type="datetimeFigureOut">
               <a:rPr lang="en-US" smtClean="0"/>
-              <a:t>08-Jun-21</a:t>
+              <a:t>09-Jun-21</a:t>
             </a:fld>
             <a:endParaRPr lang="en-US"/>
           </a:p>
@@ -4161,7 +4163,7 @@
           <a:p>
             <a:fld id="{E4E2E80C-70A6-4D76-B6F8-959F074A456C}" type="datetimeFigureOut">
               <a:rPr lang="en-US" smtClean="0"/>
-              <a:t>08-Jun-21</a:t>
+              <a:t>09-Jun-21</a:t>
             </a:fld>
             <a:endParaRPr lang="en-US"/>
           </a:p>
@@ -4444,7 +4446,7 @@
           <a:p>
             <a:fld id="{E4E2E80C-70A6-4D76-B6F8-959F074A456C}" type="datetimeFigureOut">
               <a:rPr lang="en-US" smtClean="0"/>
-              <a:t>08-Jun-21</a:t>
+              <a:t>09-Jun-21</a:t>
             </a:fld>
             <a:endParaRPr lang="en-US"/>
           </a:p>
@@ -4735,7 +4737,7 @@
           <a:p>
             <a:fld id="{E4E2E80C-70A6-4D76-B6F8-959F074A456C}" type="datetimeFigureOut">
               <a:rPr lang="en-US" smtClean="0"/>
-              <a:t>08-Jun-21</a:t>
+              <a:t>09-Jun-21</a:t>
             </a:fld>
             <a:endParaRPr lang="en-US"/>
           </a:p>
@@ -4966,7 +4968,7 @@
           <a:p>
             <a:fld id="{E4E2E80C-70A6-4D76-B6F8-959F074A456C}" type="datetimeFigureOut">
               <a:rPr lang="en-US" smtClean="0"/>
-              <a:t>08-Jun-21</a:t>
+              <a:t>09-Jun-21</a:t>
             </a:fld>
             <a:endParaRPr lang="en-US"/>
           </a:p>
@@ -5859,6 +5861,207 @@
           <p:cNvPr id="2" name="Title 1">
             <a:extLst>
               <a:ext uri="{FF2B5EF4-FFF2-40B4-BE49-F238E27FC236}">
+                <a16:creationId xmlns:a16="http://schemas.microsoft.com/office/drawing/2014/main" id="{48290056-EBA6-49D5-8DDE-0E6FD324238F}"/>
+              </a:ext>
+            </a:extLst>
+          </p:cNvPr>
+          <p:cNvSpPr>
+            <a:spLocks noGrp="1"/>
+          </p:cNvSpPr>
+          <p:nvPr>
+            <p:ph type="title"/>
+          </p:nvPr>
+        </p:nvSpPr>
+        <p:spPr/>
+        <p:txBody>
+          <a:bodyPr/>
+          <a:lstStyle/>
+          <a:p>
+            <a:r>
+              <a:rPr lang="sr-Latn-RS" dirty="0"/>
+              <a:t>Topološka analiza podataka</a:t>
+            </a:r>
+            <a:endParaRPr lang="en-US" dirty="0"/>
+          </a:p>
+        </p:txBody>
+      </p:sp>
+      <p:sp>
+        <p:nvSpPr>
+          <p:cNvPr id="3" name="Content Placeholder 2">
+            <a:extLst>
+              <a:ext uri="{FF2B5EF4-FFF2-40B4-BE49-F238E27FC236}">
+                <a16:creationId xmlns:a16="http://schemas.microsoft.com/office/drawing/2014/main" id="{6F1414B0-B4E3-4334-A5E8-13847118C9D8}"/>
+              </a:ext>
+            </a:extLst>
+          </p:cNvPr>
+          <p:cNvSpPr>
+            <a:spLocks noGrp="1"/>
+          </p:cNvSpPr>
+          <p:nvPr>
+            <p:ph idx="1"/>
+          </p:nvPr>
+        </p:nvSpPr>
+        <p:spPr/>
+        <p:txBody>
+          <a:bodyPr/>
+          <a:lstStyle/>
+          <a:p>
+            <a:r>
+              <a:rPr lang="sr-Latn-RS" dirty="0"/>
+              <a:t>Neformalno: Topologija nad podatcima predstavlja odnos elemenata baze podataka u prostoru (može biti i fomalizacija klastera)</a:t>
+            </a:r>
+          </a:p>
+          <a:p>
+            <a:endParaRPr lang="sr-Latn-RS" dirty="0"/>
+          </a:p>
+          <a:p>
+            <a:r>
+              <a:rPr lang="sr-Latn-RS" dirty="0"/>
+              <a:t>Često, diskretna reprezentacija topoloskih podataka je svedena na simplicijalne komplekse</a:t>
+            </a:r>
+          </a:p>
+        </p:txBody>
+      </p:sp>
+    </p:spTree>
+    <p:extLst>
+      <p:ext uri="{BB962C8B-B14F-4D97-AF65-F5344CB8AC3E}">
+        <p14:creationId xmlns:p14="http://schemas.microsoft.com/office/powerpoint/2010/main" val="1278088772"/>
+      </p:ext>
+    </p:extLst>
+  </p:cSld>
+  <p:clrMapOvr>
+    <a:masterClrMapping/>
+  </p:clrMapOvr>
+</p:sld>
+</file>
+
+<file path=ppt/slides/slide11.xml><?xml version="1.0" encoding="utf-8"?>
+<p:sld xmlns:a="http://schemas.openxmlformats.org/drawingml/2006/main" xmlns:r="http://schemas.openxmlformats.org/officeDocument/2006/relationships" xmlns:p="http://schemas.openxmlformats.org/presentationml/2006/main">
+  <p:cSld>
+    <p:spTree>
+      <p:nvGrpSpPr>
+        <p:cNvPr id="1" name=""/>
+        <p:cNvGrpSpPr/>
+        <p:nvPr/>
+      </p:nvGrpSpPr>
+      <p:grpSpPr>
+        <a:xfrm>
+          <a:off x="0" y="0"/>
+          <a:ext cx="0" cy="0"/>
+          <a:chOff x="0" y="0"/>
+          <a:chExt cx="0" cy="0"/>
+        </a:xfrm>
+      </p:grpSpPr>
+      <p:sp>
+        <p:nvSpPr>
+          <p:cNvPr id="2" name="Title 1">
+            <a:extLst>
+              <a:ext uri="{FF2B5EF4-FFF2-40B4-BE49-F238E27FC236}">
+                <a16:creationId xmlns:a16="http://schemas.microsoft.com/office/drawing/2014/main" id="{4B0C1218-2BA0-47A5-B5E2-471E7CC5A66F}"/>
+              </a:ext>
+            </a:extLst>
+          </p:cNvPr>
+          <p:cNvSpPr>
+            <a:spLocks noGrp="1"/>
+          </p:cNvSpPr>
+          <p:nvPr>
+            <p:ph type="title"/>
+          </p:nvPr>
+        </p:nvSpPr>
+        <p:spPr/>
+        <p:txBody>
+          <a:bodyPr/>
+          <a:lstStyle/>
+          <a:p>
+            <a:r>
+              <a:rPr lang="sr-Latn-RS" dirty="0"/>
+              <a:t>Mapper</a:t>
+            </a:r>
+            <a:endParaRPr lang="en-US" dirty="0"/>
+          </a:p>
+        </p:txBody>
+      </p:sp>
+      <p:sp>
+        <p:nvSpPr>
+          <p:cNvPr id="3" name="Content Placeholder 2">
+            <a:extLst>
+              <a:ext uri="{FF2B5EF4-FFF2-40B4-BE49-F238E27FC236}">
+                <a16:creationId xmlns:a16="http://schemas.microsoft.com/office/drawing/2014/main" id="{A8BD1325-9659-4EF4-870A-AF27ED5D5F68}"/>
+              </a:ext>
+            </a:extLst>
+          </p:cNvPr>
+          <p:cNvSpPr>
+            <a:spLocks noGrp="1"/>
+          </p:cNvSpPr>
+          <p:nvPr>
+            <p:ph idx="1"/>
+          </p:nvPr>
+        </p:nvSpPr>
+        <p:spPr/>
+        <p:txBody>
+          <a:bodyPr/>
+          <a:lstStyle/>
+          <a:p>
+            <a:r>
+              <a:rPr lang="sr-Latn-RS" dirty="0"/>
+              <a:t>Mapper je jedna od, ako ne i, najčešće korišćena topološka reprezentacija podataka</a:t>
+            </a:r>
+          </a:p>
+          <a:p>
+            <a:endParaRPr lang="sr-Latn-RS" dirty="0"/>
+          </a:p>
+          <a:p>
+            <a:r>
+              <a:rPr lang="sr-Latn-RS" dirty="0"/>
+              <a:t>On interpretira bilo kakvu listu podataka u R</a:t>
+            </a:r>
+            <a:r>
+              <a:rPr lang="sr-Latn-RS" baseline="30000" dirty="0"/>
+              <a:t>n</a:t>
+            </a:r>
+            <a:r>
+              <a:rPr lang="sr-Latn-RS" dirty="0"/>
+              <a:t> kao „oblak tacaka“, i pretvara ga u uprošćen topološki graf</a:t>
+            </a:r>
+            <a:endParaRPr lang="en-US" baseline="30000" dirty="0"/>
+          </a:p>
+        </p:txBody>
+      </p:sp>
+    </p:spTree>
+    <p:extLst>
+      <p:ext uri="{BB962C8B-B14F-4D97-AF65-F5344CB8AC3E}">
+        <p14:creationId xmlns:p14="http://schemas.microsoft.com/office/powerpoint/2010/main" val="2409000243"/>
+      </p:ext>
+    </p:extLst>
+  </p:cSld>
+  <p:clrMapOvr>
+    <a:masterClrMapping/>
+  </p:clrMapOvr>
+</p:sld>
+</file>
+
+<file path=ppt/slides/slide12.xml><?xml version="1.0" encoding="utf-8"?>
+<p:sld xmlns:a="http://schemas.openxmlformats.org/drawingml/2006/main" xmlns:r="http://schemas.openxmlformats.org/officeDocument/2006/relationships" xmlns:p="http://schemas.openxmlformats.org/presentationml/2006/main">
+  <p:cSld>
+    <p:spTree>
+      <p:nvGrpSpPr>
+        <p:cNvPr id="1" name=""/>
+        <p:cNvGrpSpPr/>
+        <p:nvPr/>
+      </p:nvGrpSpPr>
+      <p:grpSpPr>
+        <a:xfrm>
+          <a:off x="0" y="0"/>
+          <a:ext cx="0" cy="0"/>
+          <a:chOff x="0" y="0"/>
+          <a:chExt cx="0" cy="0"/>
+        </a:xfrm>
+      </p:grpSpPr>
+      <p:sp>
+        <p:nvSpPr>
+          <p:cNvPr id="2" name="Title 1">
+            <a:extLst>
+              <a:ext uri="{FF2B5EF4-FFF2-40B4-BE49-F238E27FC236}">
                 <a16:creationId xmlns:a16="http://schemas.microsoft.com/office/drawing/2014/main" id="{529A39ED-8DFE-49F5-BEBA-A50A55E9418B}"/>
               </a:ext>
             </a:extLst>
@@ -5877,7 +6080,7 @@
           <a:p>
             <a:r>
               <a:rPr lang="sr-Latn-RS" dirty="0"/>
-              <a:t>Topološka analiza podataka</a:t>
+              <a:t>Mapper</a:t>
             </a:r>
             <a:endParaRPr lang="en-US" dirty="0"/>
           </a:p>
@@ -5946,120 +6149,17 @@
           </a:p>
           <a:p>
             <a:r>
-              <a:rPr lang="en-US" dirty="0" err="1"/>
-              <a:t>Rezultujuci</a:t>
-            </a:r>
-            <a:r>
-              <a:rPr lang="en-US" dirty="0"/>
-              <a:t> </a:t>
-            </a:r>
-            <a:r>
-              <a:rPr lang="en-US" dirty="0" err="1"/>
-              <a:t>graf</a:t>
-            </a:r>
-            <a:r>
-              <a:rPr lang="en-US" dirty="0"/>
-              <a:t> </a:t>
-            </a:r>
-            <a:r>
-              <a:rPr lang="en-US" dirty="0" err="1"/>
-              <a:t>nam</a:t>
-            </a:r>
-            <a:r>
-              <a:rPr lang="en-US" dirty="0"/>
-              <a:t> </a:t>
-            </a:r>
-            <a:r>
-              <a:rPr lang="en-US" dirty="0" err="1"/>
-              <a:t>topoloski</a:t>
-            </a:r>
-            <a:r>
-              <a:rPr lang="en-US" dirty="0"/>
-              <a:t> </a:t>
-            </a:r>
-            <a:r>
-              <a:rPr lang="en-US" dirty="0" err="1"/>
-              <a:t>prikazuje</a:t>
-            </a:r>
-            <a:r>
-              <a:rPr lang="en-US" dirty="0"/>
-              <a:t> </a:t>
-            </a:r>
-            <a:r>
-              <a:rPr lang="en-US" dirty="0" err="1"/>
-              <a:t>povezanost</a:t>
-            </a:r>
-            <a:r>
-              <a:rPr lang="en-US" dirty="0"/>
-              <a:t> </a:t>
-            </a:r>
-            <a:r>
-              <a:rPr lang="en-US" dirty="0" err="1"/>
-              <a:t>interesovanja</a:t>
-            </a:r>
-            <a:r>
-              <a:rPr lang="en-US" dirty="0"/>
-              <a:t> </a:t>
-            </a:r>
-            <a:r>
-              <a:rPr lang="en-US" dirty="0" err="1"/>
-              <a:t>klijenata</a:t>
-            </a:r>
-            <a:r>
-              <a:rPr lang="en-US" dirty="0"/>
-              <a:t> </a:t>
-            </a:r>
-            <a:r>
-              <a:rPr lang="en-US" dirty="0" err="1"/>
-              <a:t>na</a:t>
-            </a:r>
-            <a:r>
-              <a:rPr lang="en-US" dirty="0"/>
-              <a:t> </a:t>
-            </a:r>
-            <a:r>
-              <a:rPr lang="en-US" dirty="0" err="1"/>
-              <a:t>osnovu</a:t>
-            </a:r>
-            <a:r>
-              <a:rPr lang="en-US" dirty="0"/>
-              <a:t> </a:t>
-            </a:r>
-            <a:r>
-              <a:rPr lang="en-US" dirty="0" err="1"/>
-              <a:t>cega</a:t>
-            </a:r>
-            <a:r>
-              <a:rPr lang="en-US" dirty="0"/>
-              <a:t> </a:t>
-            </a:r>
-            <a:r>
-              <a:rPr lang="en-US" dirty="0" err="1"/>
-              <a:t>mozemo</a:t>
-            </a:r>
-            <a:r>
-              <a:rPr lang="en-US" dirty="0"/>
-              <a:t> da </a:t>
-            </a:r>
-            <a:r>
-              <a:rPr lang="en-US" dirty="0" err="1"/>
-              <a:t>preporucimo</a:t>
-            </a:r>
-            <a:r>
-              <a:rPr lang="en-US" dirty="0"/>
-              <a:t> </a:t>
-            </a:r>
-            <a:r>
-              <a:rPr lang="en-US" dirty="0" err="1"/>
-              <a:t>filmove</a:t>
-            </a:r>
-            <a:r>
-              <a:rPr lang="en-US" dirty="0"/>
-              <a:t> </a:t>
-            </a:r>
-            <a:r>
-              <a:rPr lang="en-US" dirty="0" err="1"/>
-              <a:t>klijentima</a:t>
+              <a:rPr lang="sr-Latn-RS" dirty="0"/>
+              <a:t>Konstruišemo i prosledjujemo pokrivanjem i podskup inverya glavnog skupa</a:t>
+            </a:r>
+          </a:p>
+          <a:p>
+            <a:endParaRPr lang="sr-Latn-RS" dirty="0"/>
+          </a:p>
+          <a:p>
+            <a:r>
+              <a:rPr lang="sr-Latn-RS" dirty="0"/>
+              <a:t>Kao poslednji parametar prosledjujemo algoritam za klasterovanje u nasem slucaju koristimo 2 kako bi mogli da ih upredimo</a:t>
             </a:r>
             <a:endParaRPr lang="en-US" dirty="0"/>
           </a:p>
@@ -6078,7 +6178,7 @@
 </p:sld>
 </file>
 
-<file path=ppt/slides/slide11.xml><?xml version="1.0" encoding="utf-8"?>
+<file path=ppt/slides/slide13.xml><?xml version="1.0" encoding="utf-8"?>
 <p:sld xmlns:a="http://schemas.openxmlformats.org/drawingml/2006/main" xmlns:r="http://schemas.openxmlformats.org/officeDocument/2006/relationships" xmlns:p="http://schemas.openxmlformats.org/presentationml/2006/main">
   <p:cSld>
     <p:spTree>
@@ -6206,7 +6306,7 @@
 </p:sld>
 </file>
 
-<file path=ppt/slides/slide12.xml><?xml version="1.0" encoding="utf-8"?>
+<file path=ppt/slides/slide14.xml><?xml version="1.0" encoding="utf-8"?>
 <p:sld xmlns:a="http://schemas.openxmlformats.org/drawingml/2006/main" xmlns:r="http://schemas.openxmlformats.org/officeDocument/2006/relationships" xmlns:p="http://schemas.openxmlformats.org/presentationml/2006/main">
   <p:cSld>
     <p:spTree>
@@ -6331,7 +6431,7 @@
 </p:sld>
 </file>
 
-<file path=ppt/slides/slide13.xml><?xml version="1.0" encoding="utf-8"?>
+<file path=ppt/slides/slide15.xml><?xml version="1.0" encoding="utf-8"?>
 <p:sld xmlns:a="http://schemas.openxmlformats.org/drawingml/2006/main" xmlns:r="http://schemas.openxmlformats.org/officeDocument/2006/relationships" xmlns:p="http://schemas.openxmlformats.org/presentationml/2006/main">
   <p:cSld>
     <p:spTree>

</xml_diff>